<commit_message>
Added com dll object creation to question 2 slides
</commit_message>
<xml_diff>
--- a/NEW KPU/KPU/DEM JEG KAN/SPØRGSMÅL 2 CPP_DLL.pptx
+++ b/NEW KPU/KPU/DEM JEG KAN/SPØRGSMÅL 2 CPP_DLL.pptx
@@ -5,7 +5,7 @@
     <p:sldMasterId id="2147483648" r:id="rId1"/>
   </p:sldMasterIdLst>
   <p:notesMasterIdLst>
-    <p:notesMasterId r:id="rId13"/>
+    <p:notesMasterId r:id="rId14"/>
   </p:notesMasterIdLst>
   <p:sldIdLst>
     <p:sldId id="256" r:id="rId2"/>
@@ -18,7 +18,8 @@
     <p:sldId id="259" r:id="rId9"/>
     <p:sldId id="260" r:id="rId10"/>
     <p:sldId id="262" r:id="rId11"/>
-    <p:sldId id="264" r:id="rId12"/>
+    <p:sldId id="269" r:id="rId12"/>
+    <p:sldId id="264" r:id="rId13"/>
   </p:sldIdLst>
   <p:sldSz cx="12192000" cy="6858000"/>
   <p:notesSz cx="6858000" cy="9144000"/>
@@ -264,7 +265,7 @@
           <a:p>
             <a:fld id="{477EB860-629F-4075-AAE7-BB6DCDDAED9C}" type="datetimeFigureOut">
               <a:rPr lang="da-DK" smtClean="0"/>
-              <a:t>12-06-2020</a:t>
+              <a:t>13-08-2020</a:t>
             </a:fld>
             <a:endParaRPr lang="da-DK"/>
           </a:p>
@@ -930,7 +931,7 @@
           <a:p>
             <a:fld id="{E921C88C-E74F-4F83-8559-C2ED0921D0AE}" type="datetimeFigureOut">
               <a:rPr lang="da-DK" smtClean="0"/>
-              <a:t>12-06-2020</a:t>
+              <a:t>13-08-2020</a:t>
             </a:fld>
             <a:endParaRPr lang="da-DK"/>
           </a:p>
@@ -1128,7 +1129,7 @@
           <a:p>
             <a:fld id="{E921C88C-E74F-4F83-8559-C2ED0921D0AE}" type="datetimeFigureOut">
               <a:rPr lang="da-DK" smtClean="0"/>
-              <a:t>12-06-2020</a:t>
+              <a:t>13-08-2020</a:t>
             </a:fld>
             <a:endParaRPr lang="da-DK"/>
           </a:p>
@@ -1336,7 +1337,7 @@
           <a:p>
             <a:fld id="{E921C88C-E74F-4F83-8559-C2ED0921D0AE}" type="datetimeFigureOut">
               <a:rPr lang="da-DK" smtClean="0"/>
-              <a:t>12-06-2020</a:t>
+              <a:t>13-08-2020</a:t>
             </a:fld>
             <a:endParaRPr lang="da-DK"/>
           </a:p>
@@ -1534,7 +1535,7 @@
           <a:p>
             <a:fld id="{E921C88C-E74F-4F83-8559-C2ED0921D0AE}" type="datetimeFigureOut">
               <a:rPr lang="da-DK" smtClean="0"/>
-              <a:t>12-06-2020</a:t>
+              <a:t>13-08-2020</a:t>
             </a:fld>
             <a:endParaRPr lang="da-DK"/>
           </a:p>
@@ -1809,7 +1810,7 @@
           <a:p>
             <a:fld id="{E921C88C-E74F-4F83-8559-C2ED0921D0AE}" type="datetimeFigureOut">
               <a:rPr lang="da-DK" smtClean="0"/>
-              <a:t>12-06-2020</a:t>
+              <a:t>13-08-2020</a:t>
             </a:fld>
             <a:endParaRPr lang="da-DK"/>
           </a:p>
@@ -2074,7 +2075,7 @@
           <a:p>
             <a:fld id="{E921C88C-E74F-4F83-8559-C2ED0921D0AE}" type="datetimeFigureOut">
               <a:rPr lang="da-DK" smtClean="0"/>
-              <a:t>12-06-2020</a:t>
+              <a:t>13-08-2020</a:t>
             </a:fld>
             <a:endParaRPr lang="da-DK"/>
           </a:p>
@@ -2486,7 +2487,7 @@
           <a:p>
             <a:fld id="{E921C88C-E74F-4F83-8559-C2ED0921D0AE}" type="datetimeFigureOut">
               <a:rPr lang="da-DK" smtClean="0"/>
-              <a:t>12-06-2020</a:t>
+              <a:t>13-08-2020</a:t>
             </a:fld>
             <a:endParaRPr lang="da-DK"/>
           </a:p>
@@ -2627,7 +2628,7 @@
           <a:p>
             <a:fld id="{E921C88C-E74F-4F83-8559-C2ED0921D0AE}" type="datetimeFigureOut">
               <a:rPr lang="da-DK" smtClean="0"/>
-              <a:t>12-06-2020</a:t>
+              <a:t>13-08-2020</a:t>
             </a:fld>
             <a:endParaRPr lang="da-DK"/>
           </a:p>
@@ -2740,7 +2741,7 @@
           <a:p>
             <a:fld id="{E921C88C-E74F-4F83-8559-C2ED0921D0AE}" type="datetimeFigureOut">
               <a:rPr lang="da-DK" smtClean="0"/>
-              <a:t>12-06-2020</a:t>
+              <a:t>13-08-2020</a:t>
             </a:fld>
             <a:endParaRPr lang="da-DK"/>
           </a:p>
@@ -3051,7 +3052,7 @@
           <a:p>
             <a:fld id="{E921C88C-E74F-4F83-8559-C2ED0921D0AE}" type="datetimeFigureOut">
               <a:rPr lang="da-DK" smtClean="0"/>
-              <a:t>12-06-2020</a:t>
+              <a:t>13-08-2020</a:t>
             </a:fld>
             <a:endParaRPr lang="da-DK"/>
           </a:p>
@@ -3339,7 +3340,7 @@
           <a:p>
             <a:fld id="{E921C88C-E74F-4F83-8559-C2ED0921D0AE}" type="datetimeFigureOut">
               <a:rPr lang="da-DK" smtClean="0"/>
-              <a:t>12-06-2020</a:t>
+              <a:t>13-08-2020</a:t>
             </a:fld>
             <a:endParaRPr lang="da-DK"/>
           </a:p>
@@ -3580,7 +3581,7 @@
           <a:p>
             <a:fld id="{E921C88C-E74F-4F83-8559-C2ED0921D0AE}" type="datetimeFigureOut">
               <a:rPr lang="da-DK" smtClean="0"/>
-              <a:t>12-06-2020</a:t>
+              <a:t>13-08-2020</a:t>
             </a:fld>
             <a:endParaRPr lang="da-DK"/>
           </a:p>
@@ -4534,6 +4535,586 @@
 </file>
 
 <file path=ppt/slides/slide11.xml><?xml version="1.0" encoding="utf-8"?>
+<p:sld xmlns:a="http://schemas.openxmlformats.org/drawingml/2006/main" xmlns:r="http://schemas.openxmlformats.org/officeDocument/2006/relationships" xmlns:p="http://schemas.openxmlformats.org/presentationml/2006/main">
+  <p:cSld>
+    <p:bg>
+      <p:bgPr>
+        <a:solidFill>
+          <a:schemeClr val="bg1"/>
+        </a:solidFill>
+        <a:effectLst/>
+      </p:bgPr>
+    </p:bg>
+    <p:spTree>
+      <p:nvGrpSpPr>
+        <p:cNvPr id="1" name=""/>
+        <p:cNvGrpSpPr/>
+        <p:nvPr/>
+      </p:nvGrpSpPr>
+      <p:grpSpPr>
+        <a:xfrm>
+          <a:off x="0" y="0"/>
+          <a:ext cx="0" cy="0"/>
+          <a:chOff x="0" y="0"/>
+          <a:chExt cx="0" cy="0"/>
+        </a:xfrm>
+      </p:grpSpPr>
+      <p:sp>
+        <p:nvSpPr>
+          <p:cNvPr id="137" name="Rectangle 136">
+            <a:extLst>
+              <a:ext uri="{FF2B5EF4-FFF2-40B4-BE49-F238E27FC236}">
+                <a16:creationId xmlns:a16="http://schemas.microsoft.com/office/drawing/2014/main" id="{56C20283-73E0-40EC-8AD8-057F581F64C2}"/>
+              </a:ext>
+              <a:ext uri="{C183D7F6-B498-43B3-948B-1728B52AA6E4}">
+                <adec:decorative xmlns:adec="http://schemas.microsoft.com/office/drawing/2017/decorative" val="1"/>
+              </a:ext>
+            </a:extLst>
+          </p:cNvPr>
+          <p:cNvSpPr>
+            <a:spLocks noGrp="1" noRot="1" noChangeAspect="1" noMove="1" noResize="1" noEditPoints="1" noAdjustHandles="1" noChangeArrowheads="1" noChangeShapeType="1" noTextEdit="1"/>
+          </p:cNvSpPr>
+          <p:nvPr>
+            <p:extLst>
+              <p:ext uri="{386F3935-93C4-4BCD-93E2-E3B085C9AB24}">
+                <p16:designElem xmlns:p16="http://schemas.microsoft.com/office/powerpoint/2015/main" val="1"/>
+              </p:ext>
+            </p:extLst>
+          </p:nvPr>
+        </p:nvSpPr>
+        <p:spPr>
+          <a:xfrm>
+            <a:off x="1524" y="0"/>
+            <a:ext cx="12188952" cy="6858000"/>
+          </a:xfrm>
+          <a:prstGeom prst="rect">
+            <a:avLst/>
+          </a:prstGeom>
+          <a:solidFill>
+            <a:schemeClr val="tx1"/>
+          </a:solidFill>
+          <a:ln>
+            <a:noFill/>
+          </a:ln>
+        </p:spPr>
+        <p:style>
+          <a:lnRef idx="2">
+            <a:schemeClr val="accent1">
+              <a:shade val="50000"/>
+            </a:schemeClr>
+          </a:lnRef>
+          <a:fillRef idx="1">
+            <a:schemeClr val="accent1"/>
+          </a:fillRef>
+          <a:effectRef idx="0">
+            <a:schemeClr val="accent1"/>
+          </a:effectRef>
+          <a:fontRef idx="minor">
+            <a:schemeClr val="lt1"/>
+          </a:fontRef>
+        </p:style>
+        <p:txBody>
+          <a:bodyPr rtlCol="0" anchor="ctr"/>
+          <a:lstStyle/>
+          <a:p>
+            <a:pPr algn="ctr"/>
+            <a:endParaRPr lang="en-US"/>
+          </a:p>
+        </p:txBody>
+      </p:sp>
+      <p:sp>
+        <p:nvSpPr>
+          <p:cNvPr id="139" name="Freeform 28">
+            <a:extLst>
+              <a:ext uri="{FF2B5EF4-FFF2-40B4-BE49-F238E27FC236}">
+                <a16:creationId xmlns:a16="http://schemas.microsoft.com/office/drawing/2014/main" id="{3FCC729B-E528-40C3-82D3-BA4375575E87}"/>
+              </a:ext>
+              <a:ext uri="{C183D7F6-B498-43B3-948B-1728B52AA6E4}">
+                <adec:decorative xmlns:adec="http://schemas.microsoft.com/office/drawing/2017/decorative" val="1"/>
+              </a:ext>
+            </a:extLst>
+          </p:cNvPr>
+          <p:cNvSpPr>
+            <a:spLocks noGrp="1" noRot="1" noChangeAspect="1" noMove="1" noResize="1" noEditPoints="1" noAdjustHandles="1" noChangeArrowheads="1" noChangeShapeType="1" noTextEdit="1"/>
+          </p:cNvSpPr>
+          <p:nvPr>
+            <p:extLst>
+              <p:ext uri="{386F3935-93C4-4BCD-93E2-E3B085C9AB24}">
+                <p16:designElem xmlns:p16="http://schemas.microsoft.com/office/powerpoint/2015/main" val="1"/>
+              </p:ext>
+            </p:extLst>
+          </p:nvPr>
+        </p:nvSpPr>
+        <p:spPr>
+          <a:xfrm flipH="1" flipV="1">
+            <a:off x="960120" y="0"/>
+            <a:ext cx="11218661" cy="6858000"/>
+          </a:xfrm>
+          <a:custGeom>
+            <a:avLst/>
+            <a:gdLst>
+              <a:gd name="connsiteX0" fmla="*/ 0 w 11218661"/>
+              <a:gd name="connsiteY0" fmla="*/ 0 h 6858000"/>
+              <a:gd name="connsiteX1" fmla="*/ 8042507 w 11218661"/>
+              <a:gd name="connsiteY1" fmla="*/ 0 h 6858000"/>
+              <a:gd name="connsiteX2" fmla="*/ 11218661 w 11218661"/>
+              <a:gd name="connsiteY2" fmla="*/ 6858000 h 6858000"/>
+              <a:gd name="connsiteX3" fmla="*/ 0 w 11218661"/>
+              <a:gd name="connsiteY3" fmla="*/ 6858000 h 6858000"/>
+            </a:gdLst>
+            <a:ahLst/>
+            <a:cxnLst>
+              <a:cxn ang="0">
+                <a:pos x="connsiteX0" y="connsiteY0"/>
+              </a:cxn>
+              <a:cxn ang="0">
+                <a:pos x="connsiteX1" y="connsiteY1"/>
+              </a:cxn>
+              <a:cxn ang="0">
+                <a:pos x="connsiteX2" y="connsiteY2"/>
+              </a:cxn>
+              <a:cxn ang="0">
+                <a:pos x="connsiteX3" y="connsiteY3"/>
+              </a:cxn>
+            </a:cxnLst>
+            <a:rect l="l" t="t" r="r" b="b"/>
+            <a:pathLst>
+              <a:path w="11218661" h="6858000">
+                <a:moveTo>
+                  <a:pt x="0" y="0"/>
+                </a:moveTo>
+                <a:lnTo>
+                  <a:pt x="8042507" y="0"/>
+                </a:lnTo>
+                <a:lnTo>
+                  <a:pt x="11218661" y="6858000"/>
+                </a:lnTo>
+                <a:lnTo>
+                  <a:pt x="0" y="6858000"/>
+                </a:lnTo>
+                <a:close/>
+              </a:path>
+            </a:pathLst>
+          </a:custGeom>
+          <a:solidFill>
+            <a:schemeClr val="bg1">
+              <a:lumMod val="85000"/>
+              <a:lumOff val="15000"/>
+              <a:alpha val="70000"/>
+            </a:schemeClr>
+          </a:solidFill>
+          <a:ln>
+            <a:noFill/>
+          </a:ln>
+        </p:spPr>
+        <p:style>
+          <a:lnRef idx="2">
+            <a:schemeClr val="accent1">
+              <a:shade val="50000"/>
+            </a:schemeClr>
+          </a:lnRef>
+          <a:fillRef idx="1">
+            <a:schemeClr val="accent1"/>
+          </a:fillRef>
+          <a:effectRef idx="0">
+            <a:schemeClr val="accent1"/>
+          </a:effectRef>
+          <a:fontRef idx="minor">
+            <a:schemeClr val="lt1"/>
+          </a:fontRef>
+        </p:style>
+        <p:txBody>
+          <a:bodyPr wrap="square" rtlCol="0" anchor="ctr">
+            <a:noAutofit/>
+          </a:bodyPr>
+          <a:lstStyle/>
+          <a:p>
+            <a:pPr algn="ctr"/>
+            <a:endParaRPr lang="en-US"/>
+          </a:p>
+        </p:txBody>
+      </p:sp>
+      <p:sp>
+        <p:nvSpPr>
+          <p:cNvPr id="141" name="Freeform 26">
+            <a:extLst>
+              <a:ext uri="{FF2B5EF4-FFF2-40B4-BE49-F238E27FC236}">
+                <a16:creationId xmlns:a16="http://schemas.microsoft.com/office/drawing/2014/main" id="{58F1FB8D-1842-4A04-998D-6CF047AB2790}"/>
+              </a:ext>
+              <a:ext uri="{C183D7F6-B498-43B3-948B-1728B52AA6E4}">
+                <adec:decorative xmlns:adec="http://schemas.microsoft.com/office/drawing/2017/decorative" val="1"/>
+              </a:ext>
+            </a:extLst>
+          </p:cNvPr>
+          <p:cNvSpPr>
+            <a:spLocks noGrp="1" noRot="1" noChangeAspect="1" noMove="1" noResize="1" noEditPoints="1" noAdjustHandles="1" noChangeArrowheads="1" noChangeShapeType="1" noTextEdit="1"/>
+          </p:cNvSpPr>
+          <p:nvPr>
+            <p:extLst>
+              <p:ext uri="{386F3935-93C4-4BCD-93E2-E3B085C9AB24}">
+                <p16:designElem xmlns:p16="http://schemas.microsoft.com/office/powerpoint/2015/main" val="1"/>
+              </p:ext>
+            </p:extLst>
+          </p:nvPr>
+        </p:nvSpPr>
+        <p:spPr>
+          <a:xfrm flipH="1" flipV="1">
+            <a:off x="1420248" y="0"/>
+            <a:ext cx="10771752" cy="6858000"/>
+          </a:xfrm>
+          <a:custGeom>
+            <a:avLst/>
+            <a:gdLst>
+              <a:gd name="connsiteX0" fmla="*/ 0 w 10771752"/>
+              <a:gd name="connsiteY0" fmla="*/ 0 h 6858000"/>
+              <a:gd name="connsiteX1" fmla="*/ 7595598 w 10771752"/>
+              <a:gd name="connsiteY1" fmla="*/ 0 h 6858000"/>
+              <a:gd name="connsiteX2" fmla="*/ 10771752 w 10771752"/>
+              <a:gd name="connsiteY2" fmla="*/ 6858000 h 6858000"/>
+              <a:gd name="connsiteX3" fmla="*/ 0 w 10771752"/>
+              <a:gd name="connsiteY3" fmla="*/ 6858000 h 6858000"/>
+            </a:gdLst>
+            <a:ahLst/>
+            <a:cxnLst>
+              <a:cxn ang="0">
+                <a:pos x="connsiteX0" y="connsiteY0"/>
+              </a:cxn>
+              <a:cxn ang="0">
+                <a:pos x="connsiteX1" y="connsiteY1"/>
+              </a:cxn>
+              <a:cxn ang="0">
+                <a:pos x="connsiteX2" y="connsiteY2"/>
+              </a:cxn>
+              <a:cxn ang="0">
+                <a:pos x="connsiteX3" y="connsiteY3"/>
+              </a:cxn>
+            </a:cxnLst>
+            <a:rect l="l" t="t" r="r" b="b"/>
+            <a:pathLst>
+              <a:path w="10771752" h="6858000">
+                <a:moveTo>
+                  <a:pt x="0" y="0"/>
+                </a:moveTo>
+                <a:lnTo>
+                  <a:pt x="7595598" y="0"/>
+                </a:lnTo>
+                <a:lnTo>
+                  <a:pt x="10771752" y="6858000"/>
+                </a:lnTo>
+                <a:lnTo>
+                  <a:pt x="0" y="6858000"/>
+                </a:lnTo>
+                <a:close/>
+              </a:path>
+            </a:pathLst>
+          </a:custGeom>
+          <a:solidFill>
+            <a:schemeClr val="bg1">
+              <a:lumMod val="85000"/>
+              <a:lumOff val="15000"/>
+            </a:schemeClr>
+          </a:solidFill>
+          <a:ln>
+            <a:noFill/>
+          </a:ln>
+        </p:spPr>
+        <p:style>
+          <a:lnRef idx="2">
+            <a:schemeClr val="accent1">
+              <a:shade val="50000"/>
+            </a:schemeClr>
+          </a:lnRef>
+          <a:fillRef idx="1">
+            <a:schemeClr val="accent1"/>
+          </a:fillRef>
+          <a:effectRef idx="0">
+            <a:schemeClr val="accent1"/>
+          </a:effectRef>
+          <a:fontRef idx="minor">
+            <a:schemeClr val="lt1"/>
+          </a:fontRef>
+        </p:style>
+        <p:txBody>
+          <a:bodyPr wrap="square" rtlCol="0" anchor="ctr">
+            <a:noAutofit/>
+          </a:bodyPr>
+          <a:lstStyle/>
+          <a:p>
+            <a:pPr algn="ctr"/>
+            <a:endParaRPr lang="en-US"/>
+          </a:p>
+        </p:txBody>
+      </p:sp>
+      <p:sp>
+        <p:nvSpPr>
+          <p:cNvPr id="2" name="Titel 1">
+            <a:extLst>
+              <a:ext uri="{FF2B5EF4-FFF2-40B4-BE49-F238E27FC236}">
+                <a16:creationId xmlns:a16="http://schemas.microsoft.com/office/drawing/2014/main" id="{0C6CC75F-B426-4B2E-994E-C8CCD38E730A}"/>
+              </a:ext>
+            </a:extLst>
+          </p:cNvPr>
+          <p:cNvSpPr>
+            <a:spLocks noGrp="1"/>
+          </p:cNvSpPr>
+          <p:nvPr>
+            <p:ph type="title"/>
+          </p:nvPr>
+        </p:nvSpPr>
+        <p:spPr>
+          <a:xfrm>
+            <a:off x="2373745" y="365125"/>
+            <a:ext cx="9174788" cy="1325563"/>
+          </a:xfrm>
+        </p:spPr>
+        <p:txBody>
+          <a:bodyPr>
+            <a:normAutofit/>
+          </a:bodyPr>
+          <a:lstStyle/>
+          <a:p>
+            <a:r>
+              <a:rPr lang="da-DK" dirty="0"/>
+              <a:t>COM DLL (</a:t>
+            </a:r>
+            <a:r>
+              <a:rPr lang="da-DK" dirty="0" err="1"/>
+              <a:t>object</a:t>
+            </a:r>
+            <a:r>
+              <a:rPr lang="da-DK" dirty="0"/>
+              <a:t> </a:t>
+            </a:r>
+            <a:r>
+              <a:rPr lang="da-DK" dirty="0" err="1"/>
+              <a:t>creation</a:t>
+            </a:r>
+            <a:r>
+              <a:rPr lang="da-DK" dirty="0"/>
+              <a:t>)</a:t>
+            </a:r>
+          </a:p>
+        </p:txBody>
+      </p:sp>
+      <p:pic>
+        <p:nvPicPr>
+          <p:cNvPr id="1025" name="Picture 1" descr="Creation sequence of an object from a COM DLL serve &#10;I &#10;6 &#10;Client &#10;Call CoGetClassObject &#10;Call Createlnstance &#10;Use object &#10;COM &#10;CoGetClassObject &#10;Object &#10;Interfaces &#10;10 &#10;7 &#10;9 &#10;Look up Class in regDB &#10;ICIassFactory &#10;Look up DLL in regDB &#10;CoLoadLibrary on DLL &#10;GetProcAddress on &#10;DilGetC1assObject &#10;Return class factory &#10;pointer to user &#10;2 &#10;3 &#10;5 &#10;DLL &#10;Object &#10;8 &#10;Class Factory: &#10;Creates Object &#10;4 &#10;DllGetClassObject &#10;Create class factory &#10;Return ICIassFactory ">
+            <a:extLst>
+              <a:ext uri="{FF2B5EF4-FFF2-40B4-BE49-F238E27FC236}">
+                <a16:creationId xmlns:a16="http://schemas.microsoft.com/office/drawing/2014/main" id="{73420442-EDF1-4F26-9D29-1B4149788270}"/>
+              </a:ext>
+            </a:extLst>
+          </p:cNvPr>
+          <p:cNvPicPr>
+            <a:picLocks noChangeAspect="1" noChangeArrowheads="1"/>
+          </p:cNvPicPr>
+          <p:nvPr/>
+        </p:nvPicPr>
+        <p:blipFill>
+          <a:blip r:embed="rId2">
+            <a:extLst>
+              <a:ext uri="{28A0092B-C50C-407E-A947-70E740481C1C}">
+                <a14:useLocalDpi xmlns:a14="http://schemas.microsoft.com/office/drawing/2010/main" val="0"/>
+              </a:ext>
+            </a:extLst>
+          </a:blip>
+          <a:stretch>
+            <a:fillRect/>
+          </a:stretch>
+        </p:blipFill>
+        <p:spPr bwMode="auto">
+          <a:xfrm>
+            <a:off x="261690" y="1830408"/>
+            <a:ext cx="4464870" cy="4346554"/>
+          </a:xfrm>
+          <a:prstGeom prst="rect">
+            <a:avLst/>
+          </a:prstGeom>
+          <a:noFill/>
+          <a:extLst>
+            <a:ext uri="{909E8E84-426E-40DD-AFC4-6F175D3DCCD1}">
+              <a14:hiddenFill xmlns:a14="http://schemas.microsoft.com/office/drawing/2010/main">
+                <a:solidFill>
+                  <a:srgbClr val="FFFFFF"/>
+                </a:solidFill>
+              </a14:hiddenFill>
+            </a:ext>
+          </a:extLst>
+        </p:spPr>
+      </p:pic>
+      <p:sp>
+        <p:nvSpPr>
+          <p:cNvPr id="3" name="Pladsholder til indhold 2">
+            <a:extLst>
+              <a:ext uri="{FF2B5EF4-FFF2-40B4-BE49-F238E27FC236}">
+                <a16:creationId xmlns:a16="http://schemas.microsoft.com/office/drawing/2014/main" id="{06150888-1653-44E4-BA77-B3C0860C393F}"/>
+              </a:ext>
+            </a:extLst>
+          </p:cNvPr>
+          <p:cNvSpPr>
+            <a:spLocks noGrp="1"/>
+          </p:cNvSpPr>
+          <p:nvPr>
+            <p:ph idx="1"/>
+          </p:nvPr>
+        </p:nvSpPr>
+        <p:spPr>
+          <a:xfrm>
+            <a:off x="4738255" y="2022601"/>
+            <a:ext cx="6810277" cy="4154361"/>
+          </a:xfrm>
+        </p:spPr>
+        <p:txBody>
+          <a:bodyPr>
+            <a:normAutofit lnSpcReduction="10000"/>
+          </a:bodyPr>
+          <a:lstStyle/>
+          <a:p>
+            <a:r>
+              <a:rPr lang="en-US" sz="1700" dirty="0"/>
+              <a:t>HOW A CLIENT USES A DLL WITH A COM(Component Object Model)</a:t>
+            </a:r>
+          </a:p>
+          <a:p>
+            <a:pPr marL="514350" indent="-514350" fontAlgn="ctr">
+              <a:buFont typeface="+mj-lt"/>
+              <a:buAutoNum type="arabicPeriod"/>
+            </a:pPr>
+            <a:r>
+              <a:rPr lang="en-US" sz="1700" dirty="0"/>
+              <a:t>Client(exe) calls </a:t>
+            </a:r>
+            <a:r>
+              <a:rPr lang="en-US" sz="1700" dirty="0" err="1"/>
+              <a:t>COGetClassObject</a:t>
+            </a:r>
+            <a:endParaRPr lang="en-US" sz="1700" dirty="0"/>
+          </a:p>
+          <a:p>
+            <a:pPr marL="514350" indent="-514350" fontAlgn="ctr">
+              <a:buFont typeface="+mj-lt"/>
+              <a:buAutoNum type="arabicPeriod"/>
+            </a:pPr>
+            <a:r>
+              <a:rPr lang="en-US" sz="1700" dirty="0" err="1"/>
+              <a:t>CoLoadLibrary</a:t>
+            </a:r>
+            <a:r>
+              <a:rPr lang="en-US" sz="1700" dirty="0"/>
+              <a:t> Loads the whole DLL</a:t>
+            </a:r>
+          </a:p>
+          <a:p>
+            <a:pPr marL="514350" indent="-514350" fontAlgn="ctr">
+              <a:buFont typeface="+mj-lt"/>
+              <a:buAutoNum type="arabicPeriod"/>
+            </a:pPr>
+            <a:r>
+              <a:rPr lang="en-US" sz="1700" dirty="0" err="1"/>
+              <a:t>GetProcAddress</a:t>
+            </a:r>
+            <a:r>
+              <a:rPr lang="en-US" sz="1700" dirty="0"/>
+              <a:t> to get DLL class object, that initiates step 4 </a:t>
+            </a:r>
+          </a:p>
+          <a:p>
+            <a:pPr marL="514350" indent="-514350" fontAlgn="ctr">
+              <a:buFont typeface="+mj-lt"/>
+              <a:buAutoNum type="arabicPeriod"/>
+            </a:pPr>
+            <a:r>
+              <a:rPr lang="en-US" sz="1700" dirty="0"/>
+              <a:t>Creates class factory, so that an object can be created</a:t>
+            </a:r>
+          </a:p>
+          <a:p>
+            <a:pPr marL="514350" indent="-514350" fontAlgn="ctr">
+              <a:buFont typeface="+mj-lt"/>
+              <a:buAutoNum type="arabicPeriod"/>
+            </a:pPr>
+            <a:r>
+              <a:rPr lang="en-US" sz="1700" dirty="0"/>
+              <a:t>Class factory interface is returned to COM</a:t>
+            </a:r>
+          </a:p>
+          <a:p>
+            <a:pPr marL="514350" indent="-514350" fontAlgn="ctr">
+              <a:buFont typeface="+mj-lt"/>
+              <a:buAutoNum type="arabicPeriod"/>
+            </a:pPr>
+            <a:r>
+              <a:rPr lang="en-US" sz="1700" dirty="0"/>
+              <a:t>Pointer of </a:t>
+            </a:r>
+            <a:r>
+              <a:rPr lang="en-US" sz="1700" dirty="0" err="1"/>
+              <a:t>factoryclass</a:t>
+            </a:r>
+            <a:r>
+              <a:rPr lang="en-US" sz="1700" dirty="0"/>
+              <a:t> that spawns the DLL object  is returned to client</a:t>
+            </a:r>
+          </a:p>
+          <a:p>
+            <a:pPr marL="514350" indent="-514350" fontAlgn="ctr">
+              <a:buFont typeface="+mj-lt"/>
+              <a:buAutoNum type="arabicPeriod"/>
+            </a:pPr>
+            <a:r>
+              <a:rPr lang="en-US" sz="1700" dirty="0"/>
+              <a:t>Create instance spawns a class factory</a:t>
+            </a:r>
+          </a:p>
+          <a:p>
+            <a:pPr marL="514350" indent="-514350" fontAlgn="ctr">
+              <a:buFont typeface="+mj-lt"/>
+              <a:buAutoNum type="arabicPeriod"/>
+            </a:pPr>
+            <a:r>
+              <a:rPr lang="en-US" sz="1700" dirty="0"/>
+              <a:t>Object is created</a:t>
+            </a:r>
+          </a:p>
+          <a:p>
+            <a:pPr marL="514350" indent="-514350" fontAlgn="ctr">
+              <a:buFont typeface="+mj-lt"/>
+              <a:buAutoNum type="arabicPeriod"/>
+            </a:pPr>
+            <a:r>
+              <a:rPr lang="en-US" sz="1700" dirty="0"/>
+              <a:t>Pointer returned </a:t>
+            </a:r>
+          </a:p>
+          <a:p>
+            <a:pPr marL="514350" indent="-514350" fontAlgn="ctr">
+              <a:buFont typeface="+mj-lt"/>
+              <a:buAutoNum type="arabicPeriod"/>
+            </a:pPr>
+            <a:r>
+              <a:rPr lang="en-US" sz="1700" dirty="0"/>
+              <a:t>Client uses Object interface successfully</a:t>
+            </a:r>
+          </a:p>
+          <a:p>
+            <a:endParaRPr lang="da-DK" sz="1700" dirty="0"/>
+          </a:p>
+        </p:txBody>
+      </p:sp>
+    </p:spTree>
+    <p:extLst>
+      <p:ext uri="{BB962C8B-B14F-4D97-AF65-F5344CB8AC3E}">
+        <p14:creationId xmlns:p14="http://schemas.microsoft.com/office/powerpoint/2010/main" val="3855326667"/>
+      </p:ext>
+    </p:extLst>
+  </p:cSld>
+  <p:clrMapOvr>
+    <a:overrideClrMapping bg1="dk1" tx1="lt1" bg2="dk2" tx2="lt2" accent1="accent1" accent2="accent2" accent3="accent3" accent4="accent4" accent5="accent5" accent6="accent6" hlink="hlink" folHlink="folHlink"/>
+  </p:clrMapOvr>
+</p:sld>
+</file>
+
+<file path=ppt/slides/slide12.xml><?xml version="1.0" encoding="utf-8"?>
 <p:sld xmlns:a="http://schemas.openxmlformats.org/drawingml/2006/main" xmlns:r="http://schemas.openxmlformats.org/officeDocument/2006/relationships" xmlns:p="http://schemas.openxmlformats.org/presentationml/2006/main">
   <p:cSld>
     <p:spTree>

</xml_diff>